<commit_message>
editando ppt de correos
</commit_message>
<xml_diff>
--- a/PlantillaCorreo/CasoCartas.pptx
+++ b/PlantillaCorreo/CasoCartas.pptx
@@ -6,6 +6,12 @@
   </p:sldMasterIdLst>
   <p:sldIdLst>
     <p:sldId id="257" r:id="rId2"/>
+    <p:sldId id="258" r:id="rId3"/>
+    <p:sldId id="259" r:id="rId4"/>
+    <p:sldId id="260" r:id="rId5"/>
+    <p:sldId id="261" r:id="rId6"/>
+    <p:sldId id="262" r:id="rId7"/>
+    <p:sldId id="263" r:id="rId8"/>
   </p:sldIdLst>
   <p:sldSz cx="12192000" cy="6858000"/>
   <p:notesSz cx="6858000" cy="9144000"/>
@@ -104,6 +110,11 @@
       </a:defRPr>
     </a:lvl9pPr>
   </p:defaultTextStyle>
+  <p:extLst>
+    <p:ext uri="{EFAFB233-063F-42B5-8137-9DF3F51BA10A}">
+      <p15:sldGuideLst xmlns:p15="http://schemas.microsoft.com/office/powerpoint/2012/main"/>
+    </p:ext>
+  </p:extLst>
 </p:presentation>
 </file>
 
@@ -254,7 +265,7 @@
           <a:p>
             <a:fld id="{94F0288F-6852-4BBE-949A-C4E1041386CF}" type="datetimeFigureOut">
               <a:rPr lang="es-ES" smtClean="0"/>
-              <a:t>16/02/2022</a:t>
+              <a:t>22/02/2022</a:t>
             </a:fld>
             <a:endParaRPr lang="es-ES"/>
           </a:p>
@@ -308,7 +319,7 @@
           <a:p>
             <a:fld id="{1D6D6DAC-7E97-4D41-9C6C-52B9D42DB657}" type="slidenum">
               <a:rPr lang="es-ES" smtClean="0"/>
-              <a:t>‹Nº›</a:t>
+              <a:t>‹#›</a:t>
             </a:fld>
             <a:endParaRPr lang="es-ES"/>
           </a:p>
@@ -452,7 +463,7 @@
           <a:p>
             <a:fld id="{94F0288F-6852-4BBE-949A-C4E1041386CF}" type="datetimeFigureOut">
               <a:rPr lang="es-ES" smtClean="0"/>
-              <a:t>16/02/2022</a:t>
+              <a:t>22/02/2022</a:t>
             </a:fld>
             <a:endParaRPr lang="es-ES"/>
           </a:p>
@@ -506,7 +517,7 @@
           <a:p>
             <a:fld id="{1D6D6DAC-7E97-4D41-9C6C-52B9D42DB657}" type="slidenum">
               <a:rPr lang="es-ES" smtClean="0"/>
-              <a:t>‹Nº›</a:t>
+              <a:t>‹#›</a:t>
             </a:fld>
             <a:endParaRPr lang="es-ES"/>
           </a:p>
@@ -660,7 +671,7 @@
           <a:p>
             <a:fld id="{94F0288F-6852-4BBE-949A-C4E1041386CF}" type="datetimeFigureOut">
               <a:rPr lang="es-ES" smtClean="0"/>
-              <a:t>16/02/2022</a:t>
+              <a:t>22/02/2022</a:t>
             </a:fld>
             <a:endParaRPr lang="es-ES"/>
           </a:p>
@@ -714,7 +725,7 @@
           <a:p>
             <a:fld id="{1D6D6DAC-7E97-4D41-9C6C-52B9D42DB657}" type="slidenum">
               <a:rPr lang="es-ES" smtClean="0"/>
-              <a:t>‹Nº›</a:t>
+              <a:t>‹#›</a:t>
             </a:fld>
             <a:endParaRPr lang="es-ES"/>
           </a:p>
@@ -858,7 +869,7 @@
           <a:p>
             <a:fld id="{94F0288F-6852-4BBE-949A-C4E1041386CF}" type="datetimeFigureOut">
               <a:rPr lang="es-ES" smtClean="0"/>
-              <a:t>16/02/2022</a:t>
+              <a:t>22/02/2022</a:t>
             </a:fld>
             <a:endParaRPr lang="es-ES"/>
           </a:p>
@@ -912,7 +923,7 @@
           <a:p>
             <a:fld id="{1D6D6DAC-7E97-4D41-9C6C-52B9D42DB657}" type="slidenum">
               <a:rPr lang="es-ES" smtClean="0"/>
-              <a:t>‹Nº›</a:t>
+              <a:t>‹#›</a:t>
             </a:fld>
             <a:endParaRPr lang="es-ES"/>
           </a:p>
@@ -1133,7 +1144,7 @@
           <a:p>
             <a:fld id="{94F0288F-6852-4BBE-949A-C4E1041386CF}" type="datetimeFigureOut">
               <a:rPr lang="es-ES" smtClean="0"/>
-              <a:t>16/02/2022</a:t>
+              <a:t>22/02/2022</a:t>
             </a:fld>
             <a:endParaRPr lang="es-ES"/>
           </a:p>
@@ -1187,7 +1198,7 @@
           <a:p>
             <a:fld id="{1D6D6DAC-7E97-4D41-9C6C-52B9D42DB657}" type="slidenum">
               <a:rPr lang="es-ES" smtClean="0"/>
-              <a:t>‹Nº›</a:t>
+              <a:t>‹#›</a:t>
             </a:fld>
             <a:endParaRPr lang="es-ES"/>
           </a:p>
@@ -1398,7 +1409,7 @@
           <a:p>
             <a:fld id="{94F0288F-6852-4BBE-949A-C4E1041386CF}" type="datetimeFigureOut">
               <a:rPr lang="es-ES" smtClean="0"/>
-              <a:t>16/02/2022</a:t>
+              <a:t>22/02/2022</a:t>
             </a:fld>
             <a:endParaRPr lang="es-ES"/>
           </a:p>
@@ -1452,7 +1463,7 @@
           <a:p>
             <a:fld id="{1D6D6DAC-7E97-4D41-9C6C-52B9D42DB657}" type="slidenum">
               <a:rPr lang="es-ES" smtClean="0"/>
-              <a:t>‹Nº›</a:t>
+              <a:t>‹#›</a:t>
             </a:fld>
             <a:endParaRPr lang="es-ES"/>
           </a:p>
@@ -1810,7 +1821,7 @@
           <a:p>
             <a:fld id="{94F0288F-6852-4BBE-949A-C4E1041386CF}" type="datetimeFigureOut">
               <a:rPr lang="es-ES" smtClean="0"/>
-              <a:t>16/02/2022</a:t>
+              <a:t>22/02/2022</a:t>
             </a:fld>
             <a:endParaRPr lang="es-ES"/>
           </a:p>
@@ -1864,7 +1875,7 @@
           <a:p>
             <a:fld id="{1D6D6DAC-7E97-4D41-9C6C-52B9D42DB657}" type="slidenum">
               <a:rPr lang="es-ES" smtClean="0"/>
-              <a:t>‹Nº›</a:t>
+              <a:t>‹#›</a:t>
             </a:fld>
             <a:endParaRPr lang="es-ES"/>
           </a:p>
@@ -1951,7 +1962,7 @@
           <a:p>
             <a:fld id="{94F0288F-6852-4BBE-949A-C4E1041386CF}" type="datetimeFigureOut">
               <a:rPr lang="es-ES" smtClean="0"/>
-              <a:t>16/02/2022</a:t>
+              <a:t>22/02/2022</a:t>
             </a:fld>
             <a:endParaRPr lang="es-ES"/>
           </a:p>
@@ -2005,7 +2016,7 @@
           <a:p>
             <a:fld id="{1D6D6DAC-7E97-4D41-9C6C-52B9D42DB657}" type="slidenum">
               <a:rPr lang="es-ES" smtClean="0"/>
-              <a:t>‹Nº›</a:t>
+              <a:t>‹#›</a:t>
             </a:fld>
             <a:endParaRPr lang="es-ES"/>
           </a:p>
@@ -2064,7 +2075,7 @@
           <a:p>
             <a:fld id="{94F0288F-6852-4BBE-949A-C4E1041386CF}" type="datetimeFigureOut">
               <a:rPr lang="es-ES" smtClean="0"/>
-              <a:t>16/02/2022</a:t>
+              <a:t>22/02/2022</a:t>
             </a:fld>
             <a:endParaRPr lang="es-ES"/>
           </a:p>
@@ -2118,7 +2129,7 @@
           <a:p>
             <a:fld id="{1D6D6DAC-7E97-4D41-9C6C-52B9D42DB657}" type="slidenum">
               <a:rPr lang="es-ES" smtClean="0"/>
-              <a:t>‹Nº›</a:t>
+              <a:t>‹#›</a:t>
             </a:fld>
             <a:endParaRPr lang="es-ES"/>
           </a:p>
@@ -2375,7 +2386,7 @@
           <a:p>
             <a:fld id="{94F0288F-6852-4BBE-949A-C4E1041386CF}" type="datetimeFigureOut">
               <a:rPr lang="es-ES" smtClean="0"/>
-              <a:t>16/02/2022</a:t>
+              <a:t>22/02/2022</a:t>
             </a:fld>
             <a:endParaRPr lang="es-ES"/>
           </a:p>
@@ -2429,7 +2440,7 @@
           <a:p>
             <a:fld id="{1D6D6DAC-7E97-4D41-9C6C-52B9D42DB657}" type="slidenum">
               <a:rPr lang="es-ES" smtClean="0"/>
-              <a:t>‹Nº›</a:t>
+              <a:t>‹#›</a:t>
             </a:fld>
             <a:endParaRPr lang="es-ES"/>
           </a:p>
@@ -2663,7 +2674,7 @@
           <a:p>
             <a:fld id="{94F0288F-6852-4BBE-949A-C4E1041386CF}" type="datetimeFigureOut">
               <a:rPr lang="es-ES" smtClean="0"/>
-              <a:t>16/02/2022</a:t>
+              <a:t>22/02/2022</a:t>
             </a:fld>
             <a:endParaRPr lang="es-ES"/>
           </a:p>
@@ -2717,7 +2728,7 @@
           <a:p>
             <a:fld id="{1D6D6DAC-7E97-4D41-9C6C-52B9D42DB657}" type="slidenum">
               <a:rPr lang="es-ES" smtClean="0"/>
-              <a:t>‹Nº›</a:t>
+              <a:t>‹#›</a:t>
             </a:fld>
             <a:endParaRPr lang="es-ES"/>
           </a:p>
@@ -2904,7 +2915,7 @@
           <a:p>
             <a:fld id="{94F0288F-6852-4BBE-949A-C4E1041386CF}" type="datetimeFigureOut">
               <a:rPr lang="es-ES" smtClean="0"/>
-              <a:t>16/02/2022</a:t>
+              <a:t>22/02/2022</a:t>
             </a:fld>
             <a:endParaRPr lang="es-ES"/>
           </a:p>
@@ -2994,7 +3005,7 @@
           <a:p>
             <a:fld id="{1D6D6DAC-7E97-4D41-9C6C-52B9D42DB657}" type="slidenum">
               <a:rPr lang="es-ES" smtClean="0"/>
-              <a:t>‹Nº›</a:t>
+              <a:t>‹#›</a:t>
             </a:fld>
             <a:endParaRPr lang="es-ES"/>
           </a:p>
@@ -5976,6 +5987,428 @@
 </p:sld>
 </file>
 
+<file path=ppt/slides/slide2.xml><?xml version="1.0" encoding="utf-8"?>
+<p:sld xmlns:a="http://schemas.openxmlformats.org/drawingml/2006/main" xmlns:r="http://schemas.openxmlformats.org/officeDocument/2006/relationships" xmlns:p="http://schemas.openxmlformats.org/presentationml/2006/main">
+  <p:cSld>
+    <p:spTree>
+      <p:nvGrpSpPr>
+        <p:cNvPr id="1" name=""/>
+        <p:cNvGrpSpPr/>
+        <p:nvPr/>
+      </p:nvGrpSpPr>
+      <p:grpSpPr>
+        <a:xfrm>
+          <a:off x="0" y="0"/>
+          <a:ext cx="0" cy="0"/>
+          <a:chOff x="0" y="0"/>
+          <a:chExt cx="0" cy="0"/>
+        </a:xfrm>
+      </p:grpSpPr>
+      <p:sp>
+        <p:nvSpPr>
+          <p:cNvPr id="4" name="TextBox 3">
+            <a:extLst>
+              <a:ext uri="{FF2B5EF4-FFF2-40B4-BE49-F238E27FC236}">
+                <a16:creationId xmlns:a16="http://schemas.microsoft.com/office/drawing/2014/main" id="{A3295C87-2602-40FF-BFB0-A9E6340FC677}"/>
+              </a:ext>
+            </a:extLst>
+          </p:cNvPr>
+          <p:cNvSpPr txBox="1"/>
+          <p:nvPr/>
+        </p:nvSpPr>
+        <p:spPr>
+          <a:xfrm>
+            <a:off x="276224" y="161925"/>
+            <a:ext cx="3228975" cy="369332"/>
+          </a:xfrm>
+          <a:prstGeom prst="rect">
+            <a:avLst/>
+          </a:prstGeom>
+          <a:noFill/>
+        </p:spPr>
+        <p:txBody>
+          <a:bodyPr wrap="square" rtlCol="0">
+            <a:spAutoFit/>
+          </a:bodyPr>
+          <a:lstStyle/>
+          <a:p>
+            <a:r>
+              <a:rPr lang="en-US" dirty="0" err="1"/>
+              <a:t>Correo</a:t>
+            </a:r>
+            <a:r>
+              <a:rPr lang="en-US" dirty="0"/>
+              <a:t> </a:t>
+            </a:r>
+            <a:r>
+              <a:rPr lang="en-US" dirty="0" err="1"/>
+              <a:t>Hogar</a:t>
+            </a:r>
+            <a:r>
+              <a:rPr lang="en-US" dirty="0"/>
+              <a:t> 1</a:t>
+            </a:r>
+          </a:p>
+        </p:txBody>
+      </p:sp>
+      <p:pic>
+        <p:nvPicPr>
+          <p:cNvPr id="6" name="Picture 5">
+            <a:extLst>
+              <a:ext uri="{FF2B5EF4-FFF2-40B4-BE49-F238E27FC236}">
+                <a16:creationId xmlns:a16="http://schemas.microsoft.com/office/drawing/2014/main" id="{8036D777-3D7E-4EC2-A172-905F5CCD2F81}"/>
+              </a:ext>
+            </a:extLst>
+          </p:cNvPr>
+          <p:cNvPicPr>
+            <a:picLocks noChangeAspect="1"/>
+          </p:cNvPicPr>
+          <p:nvPr/>
+        </p:nvPicPr>
+        <p:blipFill>
+          <a:blip r:embed="rId2"/>
+          <a:stretch>
+            <a:fillRect/>
+          </a:stretch>
+        </p:blipFill>
+        <p:spPr>
+          <a:xfrm>
+            <a:off x="1606432" y="704553"/>
+            <a:ext cx="4578585" cy="5772447"/>
+          </a:xfrm>
+          <a:prstGeom prst="rect">
+            <a:avLst/>
+          </a:prstGeom>
+        </p:spPr>
+      </p:pic>
+      <p:pic>
+        <p:nvPicPr>
+          <p:cNvPr id="8" name="Picture 7">
+            <a:extLst>
+              <a:ext uri="{FF2B5EF4-FFF2-40B4-BE49-F238E27FC236}">
+                <a16:creationId xmlns:a16="http://schemas.microsoft.com/office/drawing/2014/main" id="{23CC013F-6074-4455-A226-DE45F42630CB}"/>
+              </a:ext>
+            </a:extLst>
+          </p:cNvPr>
+          <p:cNvPicPr>
+            <a:picLocks noChangeAspect="1"/>
+          </p:cNvPicPr>
+          <p:nvPr/>
+        </p:nvPicPr>
+        <p:blipFill>
+          <a:blip r:embed="rId3"/>
+          <a:stretch>
+            <a:fillRect/>
+          </a:stretch>
+        </p:blipFill>
+        <p:spPr>
+          <a:xfrm>
+            <a:off x="6619757" y="1765058"/>
+            <a:ext cx="4591286" cy="4711942"/>
+          </a:xfrm>
+          <a:prstGeom prst="rect">
+            <a:avLst/>
+          </a:prstGeom>
+        </p:spPr>
+      </p:pic>
+    </p:spTree>
+    <p:extLst>
+      <p:ext uri="{BB962C8B-B14F-4D97-AF65-F5344CB8AC3E}">
+        <p14:creationId xmlns:p14="http://schemas.microsoft.com/office/powerpoint/2010/main" val="509106703"/>
+      </p:ext>
+    </p:extLst>
+  </p:cSld>
+  <p:clrMapOvr>
+    <a:masterClrMapping/>
+  </p:clrMapOvr>
+</p:sld>
+</file>
+
+<file path=ppt/slides/slide3.xml><?xml version="1.0" encoding="utf-8"?>
+<p:sld xmlns:a="http://schemas.openxmlformats.org/drawingml/2006/main" xmlns:r="http://schemas.openxmlformats.org/officeDocument/2006/relationships" xmlns:p="http://schemas.openxmlformats.org/presentationml/2006/main">
+  <p:cSld>
+    <p:spTree>
+      <p:nvGrpSpPr>
+        <p:cNvPr id="1" name=""/>
+        <p:cNvGrpSpPr/>
+        <p:nvPr/>
+      </p:nvGrpSpPr>
+      <p:grpSpPr>
+        <a:xfrm>
+          <a:off x="0" y="0"/>
+          <a:ext cx="0" cy="0"/>
+          <a:chOff x="0" y="0"/>
+          <a:chExt cx="0" cy="0"/>
+        </a:xfrm>
+      </p:grpSpPr>
+      <p:sp>
+        <p:nvSpPr>
+          <p:cNvPr id="2" name="TextBox 1">
+            <a:extLst>
+              <a:ext uri="{FF2B5EF4-FFF2-40B4-BE49-F238E27FC236}">
+                <a16:creationId xmlns:a16="http://schemas.microsoft.com/office/drawing/2014/main" id="{158409EB-A7F4-48AE-956F-A1BD3D020B68}"/>
+              </a:ext>
+            </a:extLst>
+          </p:cNvPr>
+          <p:cNvSpPr txBox="1"/>
+          <p:nvPr/>
+        </p:nvSpPr>
+        <p:spPr>
+          <a:xfrm>
+            <a:off x="0" y="-48134"/>
+            <a:ext cx="3228975" cy="369332"/>
+          </a:xfrm>
+          <a:prstGeom prst="rect">
+            <a:avLst/>
+          </a:prstGeom>
+          <a:noFill/>
+        </p:spPr>
+        <p:txBody>
+          <a:bodyPr wrap="square" rtlCol="0">
+            <a:spAutoFit/>
+          </a:bodyPr>
+          <a:lstStyle/>
+          <a:p>
+            <a:r>
+              <a:rPr lang="en-US" dirty="0" err="1"/>
+              <a:t>Correo</a:t>
+            </a:r>
+            <a:r>
+              <a:rPr lang="en-US" dirty="0"/>
+              <a:t> </a:t>
+            </a:r>
+            <a:r>
+              <a:rPr lang="en-US" dirty="0" err="1"/>
+              <a:t>Hogar</a:t>
+            </a:r>
+            <a:r>
+              <a:rPr lang="en-US" dirty="0"/>
+              <a:t> 3</a:t>
+            </a:r>
+          </a:p>
+        </p:txBody>
+      </p:sp>
+      <p:pic>
+        <p:nvPicPr>
+          <p:cNvPr id="4" name="Picture 3">
+            <a:extLst>
+              <a:ext uri="{FF2B5EF4-FFF2-40B4-BE49-F238E27FC236}">
+                <a16:creationId xmlns:a16="http://schemas.microsoft.com/office/drawing/2014/main" id="{EC47FC7B-8F3D-4BC2-84C3-8397DC995B58}"/>
+              </a:ext>
+            </a:extLst>
+          </p:cNvPr>
+          <p:cNvPicPr>
+            <a:picLocks noChangeAspect="1"/>
+          </p:cNvPicPr>
+          <p:nvPr/>
+        </p:nvPicPr>
+        <p:blipFill>
+          <a:blip r:embed="rId2"/>
+          <a:stretch>
+            <a:fillRect/>
+          </a:stretch>
+        </p:blipFill>
+        <p:spPr>
+          <a:xfrm>
+            <a:off x="581024" y="685659"/>
+            <a:ext cx="4534133" cy="5486682"/>
+          </a:xfrm>
+          <a:prstGeom prst="rect">
+            <a:avLst/>
+          </a:prstGeom>
+        </p:spPr>
+      </p:pic>
+      <p:pic>
+        <p:nvPicPr>
+          <p:cNvPr id="6" name="Picture 5">
+            <a:extLst>
+              <a:ext uri="{FF2B5EF4-FFF2-40B4-BE49-F238E27FC236}">
+                <a16:creationId xmlns:a16="http://schemas.microsoft.com/office/drawing/2014/main" id="{14132A9B-A2C7-4B53-A8F2-8A6C7C0185A2}"/>
+              </a:ext>
+            </a:extLst>
+          </p:cNvPr>
+          <p:cNvPicPr>
+            <a:picLocks noChangeAspect="1"/>
+          </p:cNvPicPr>
+          <p:nvPr/>
+        </p:nvPicPr>
+        <p:blipFill rotWithShape="1">
+          <a:blip r:embed="rId3"/>
+          <a:srcRect t="7607"/>
+          <a:stretch/>
+        </p:blipFill>
+        <p:spPr>
+          <a:xfrm>
+            <a:off x="6096000" y="0"/>
+            <a:ext cx="4553184" cy="5321596"/>
+          </a:xfrm>
+          <a:prstGeom prst="rect">
+            <a:avLst/>
+          </a:prstGeom>
+        </p:spPr>
+      </p:pic>
+      <p:pic>
+        <p:nvPicPr>
+          <p:cNvPr id="8" name="Picture 7">
+            <a:extLst>
+              <a:ext uri="{FF2B5EF4-FFF2-40B4-BE49-F238E27FC236}">
+                <a16:creationId xmlns:a16="http://schemas.microsoft.com/office/drawing/2014/main" id="{982E71A6-9BEB-4526-9354-A2B754A0822D}"/>
+              </a:ext>
+            </a:extLst>
+          </p:cNvPr>
+          <p:cNvPicPr>
+            <a:picLocks noChangeAspect="1"/>
+          </p:cNvPicPr>
+          <p:nvPr/>
+        </p:nvPicPr>
+        <p:blipFill rotWithShape="1">
+          <a:blip r:embed="rId4"/>
+          <a:srcRect t="5389"/>
+          <a:stretch/>
+        </p:blipFill>
+        <p:spPr>
+          <a:xfrm>
+            <a:off x="6089650" y="5054825"/>
+            <a:ext cx="4559534" cy="2235032"/>
+          </a:xfrm>
+          <a:prstGeom prst="rect">
+            <a:avLst/>
+          </a:prstGeom>
+        </p:spPr>
+      </p:pic>
+    </p:spTree>
+    <p:extLst>
+      <p:ext uri="{BB962C8B-B14F-4D97-AF65-F5344CB8AC3E}">
+        <p14:creationId xmlns:p14="http://schemas.microsoft.com/office/powerpoint/2010/main" val="1324220693"/>
+      </p:ext>
+    </p:extLst>
+  </p:cSld>
+  <p:clrMapOvr>
+    <a:masterClrMapping/>
+  </p:clrMapOvr>
+</p:sld>
+</file>
+
+<file path=ppt/slides/slide4.xml><?xml version="1.0" encoding="utf-8"?>
+<p:sld xmlns:a="http://schemas.openxmlformats.org/drawingml/2006/main" xmlns:r="http://schemas.openxmlformats.org/officeDocument/2006/relationships" xmlns:p="http://schemas.openxmlformats.org/presentationml/2006/main">
+  <p:cSld>
+    <p:spTree>
+      <p:nvGrpSpPr>
+        <p:cNvPr id="1" name=""/>
+        <p:cNvGrpSpPr/>
+        <p:nvPr/>
+      </p:nvGrpSpPr>
+      <p:grpSpPr>
+        <a:xfrm>
+          <a:off x="0" y="0"/>
+          <a:ext cx="0" cy="0"/>
+          <a:chOff x="0" y="0"/>
+          <a:chExt cx="0" cy="0"/>
+        </a:xfrm>
+      </p:grpSpPr>
+    </p:spTree>
+    <p:extLst>
+      <p:ext uri="{BB962C8B-B14F-4D97-AF65-F5344CB8AC3E}">
+        <p14:creationId xmlns:p14="http://schemas.microsoft.com/office/powerpoint/2010/main" val="52580248"/>
+      </p:ext>
+    </p:extLst>
+  </p:cSld>
+  <p:clrMapOvr>
+    <a:masterClrMapping/>
+  </p:clrMapOvr>
+</p:sld>
+</file>
+
+<file path=ppt/slides/slide5.xml><?xml version="1.0" encoding="utf-8"?>
+<p:sld xmlns:a="http://schemas.openxmlformats.org/drawingml/2006/main" xmlns:r="http://schemas.openxmlformats.org/officeDocument/2006/relationships" xmlns:p="http://schemas.openxmlformats.org/presentationml/2006/main">
+  <p:cSld>
+    <p:spTree>
+      <p:nvGrpSpPr>
+        <p:cNvPr id="1" name=""/>
+        <p:cNvGrpSpPr/>
+        <p:nvPr/>
+      </p:nvGrpSpPr>
+      <p:grpSpPr>
+        <a:xfrm>
+          <a:off x="0" y="0"/>
+          <a:ext cx="0" cy="0"/>
+          <a:chOff x="0" y="0"/>
+          <a:chExt cx="0" cy="0"/>
+        </a:xfrm>
+      </p:grpSpPr>
+    </p:spTree>
+    <p:extLst>
+      <p:ext uri="{BB962C8B-B14F-4D97-AF65-F5344CB8AC3E}">
+        <p14:creationId xmlns:p14="http://schemas.microsoft.com/office/powerpoint/2010/main" val="2125818262"/>
+      </p:ext>
+    </p:extLst>
+  </p:cSld>
+  <p:clrMapOvr>
+    <a:masterClrMapping/>
+  </p:clrMapOvr>
+</p:sld>
+</file>
+
+<file path=ppt/slides/slide6.xml><?xml version="1.0" encoding="utf-8"?>
+<p:sld xmlns:a="http://schemas.openxmlformats.org/drawingml/2006/main" xmlns:r="http://schemas.openxmlformats.org/officeDocument/2006/relationships" xmlns:p="http://schemas.openxmlformats.org/presentationml/2006/main">
+  <p:cSld>
+    <p:spTree>
+      <p:nvGrpSpPr>
+        <p:cNvPr id="1" name=""/>
+        <p:cNvGrpSpPr/>
+        <p:nvPr/>
+      </p:nvGrpSpPr>
+      <p:grpSpPr>
+        <a:xfrm>
+          <a:off x="0" y="0"/>
+          <a:ext cx="0" cy="0"/>
+          <a:chOff x="0" y="0"/>
+          <a:chExt cx="0" cy="0"/>
+        </a:xfrm>
+      </p:grpSpPr>
+    </p:spTree>
+    <p:extLst>
+      <p:ext uri="{BB962C8B-B14F-4D97-AF65-F5344CB8AC3E}">
+        <p14:creationId xmlns:p14="http://schemas.microsoft.com/office/powerpoint/2010/main" val="4234942315"/>
+      </p:ext>
+    </p:extLst>
+  </p:cSld>
+  <p:clrMapOvr>
+    <a:masterClrMapping/>
+  </p:clrMapOvr>
+</p:sld>
+</file>
+
+<file path=ppt/slides/slide7.xml><?xml version="1.0" encoding="utf-8"?>
+<p:sld xmlns:a="http://schemas.openxmlformats.org/drawingml/2006/main" xmlns:r="http://schemas.openxmlformats.org/officeDocument/2006/relationships" xmlns:p="http://schemas.openxmlformats.org/presentationml/2006/main">
+  <p:cSld>
+    <p:spTree>
+      <p:nvGrpSpPr>
+        <p:cNvPr id="1" name=""/>
+        <p:cNvGrpSpPr/>
+        <p:nvPr/>
+      </p:nvGrpSpPr>
+      <p:grpSpPr>
+        <a:xfrm>
+          <a:off x="0" y="0"/>
+          <a:ext cx="0" cy="0"/>
+          <a:chOff x="0" y="0"/>
+          <a:chExt cx="0" cy="0"/>
+        </a:xfrm>
+      </p:grpSpPr>
+    </p:spTree>
+    <p:extLst>
+      <p:ext uri="{BB962C8B-B14F-4D97-AF65-F5344CB8AC3E}">
+        <p14:creationId xmlns:p14="http://schemas.microsoft.com/office/powerpoint/2010/main" val="575627551"/>
+      </p:ext>
+    </p:extLst>
+  </p:cSld>
+  <p:clrMapOvr>
+    <a:masterClrMapping/>
+  </p:clrMapOvr>
+</p:sld>
+</file>
+
 <file path=ppt/theme/theme1.xml><?xml version="1.0" encoding="utf-8"?>
 <a:theme xmlns:a="http://schemas.openxmlformats.org/drawingml/2006/main" name="Tema de Office">
   <a:themeElements>

</xml_diff>

<commit_message>
ppt correos hogar y negocios
</commit_message>
<xml_diff>
--- a/PlantillaCorreo/CasoCartas.pptx
+++ b/PlantillaCorreo/CasoCartas.pptx
@@ -6306,6 +6306,141 @@
           <a:chExt cx="0" cy="0"/>
         </a:xfrm>
       </p:grpSpPr>
+      <p:sp>
+        <p:nvSpPr>
+          <p:cNvPr id="2" name="TextBox 1">
+            <a:extLst>
+              <a:ext uri="{FF2B5EF4-FFF2-40B4-BE49-F238E27FC236}">
+                <a16:creationId xmlns:a16="http://schemas.microsoft.com/office/drawing/2014/main" id="{BBA3AE6E-C25F-4C70-8109-0E5603816CB4}"/>
+              </a:ext>
+            </a:extLst>
+          </p:cNvPr>
+          <p:cNvSpPr txBox="1"/>
+          <p:nvPr/>
+        </p:nvSpPr>
+        <p:spPr>
+          <a:xfrm>
+            <a:off x="0" y="-48134"/>
+            <a:ext cx="3228975" cy="369332"/>
+          </a:xfrm>
+          <a:prstGeom prst="rect">
+            <a:avLst/>
+          </a:prstGeom>
+          <a:noFill/>
+        </p:spPr>
+        <p:txBody>
+          <a:bodyPr wrap="square" rtlCol="0">
+            <a:spAutoFit/>
+          </a:bodyPr>
+          <a:lstStyle/>
+          <a:p>
+            <a:r>
+              <a:rPr lang="en-US" dirty="0" err="1"/>
+              <a:t>Correo</a:t>
+            </a:r>
+            <a:r>
+              <a:rPr lang="en-US" dirty="0"/>
+              <a:t> </a:t>
+            </a:r>
+            <a:r>
+              <a:rPr lang="en-US" dirty="0" err="1"/>
+              <a:t>Negocio</a:t>
+            </a:r>
+            <a:r>
+              <a:rPr lang="en-US" dirty="0"/>
+              <a:t> 1</a:t>
+            </a:r>
+          </a:p>
+        </p:txBody>
+      </p:sp>
+      <p:pic>
+        <p:nvPicPr>
+          <p:cNvPr id="4" name="Picture 3">
+            <a:extLst>
+              <a:ext uri="{FF2B5EF4-FFF2-40B4-BE49-F238E27FC236}">
+                <a16:creationId xmlns:a16="http://schemas.microsoft.com/office/drawing/2014/main" id="{A5F69F6A-B5F9-4B06-AA2A-9B93E65DCCCE}"/>
+              </a:ext>
+            </a:extLst>
+          </p:cNvPr>
+          <p:cNvPicPr>
+            <a:picLocks noChangeAspect="1"/>
+          </p:cNvPicPr>
+          <p:nvPr/>
+        </p:nvPicPr>
+        <p:blipFill>
+          <a:blip r:embed="rId2"/>
+          <a:stretch>
+            <a:fillRect/>
+          </a:stretch>
+        </p:blipFill>
+        <p:spPr>
+          <a:xfrm>
+            <a:off x="238009" y="596754"/>
+            <a:ext cx="4496031" cy="5664491"/>
+          </a:xfrm>
+          <a:prstGeom prst="rect">
+            <a:avLst/>
+          </a:prstGeom>
+        </p:spPr>
+      </p:pic>
+      <p:pic>
+        <p:nvPicPr>
+          <p:cNvPr id="6" name="Picture 5">
+            <a:extLst>
+              <a:ext uri="{FF2B5EF4-FFF2-40B4-BE49-F238E27FC236}">
+                <a16:creationId xmlns:a16="http://schemas.microsoft.com/office/drawing/2014/main" id="{EAB80D57-E7B0-4087-ACBA-4990F781A413}"/>
+              </a:ext>
+            </a:extLst>
+          </p:cNvPr>
+          <p:cNvPicPr>
+            <a:picLocks noChangeAspect="1"/>
+          </p:cNvPicPr>
+          <p:nvPr/>
+        </p:nvPicPr>
+        <p:blipFill rotWithShape="1">
+          <a:blip r:embed="rId3"/>
+          <a:srcRect/>
+          <a:stretch/>
+        </p:blipFill>
+        <p:spPr>
+          <a:xfrm>
+            <a:off x="5768859" y="136532"/>
+            <a:ext cx="4521432" cy="5505733"/>
+          </a:xfrm>
+          <a:prstGeom prst="rect">
+            <a:avLst/>
+          </a:prstGeom>
+        </p:spPr>
+      </p:pic>
+      <p:pic>
+        <p:nvPicPr>
+          <p:cNvPr id="8" name="Picture 7">
+            <a:extLst>
+              <a:ext uri="{FF2B5EF4-FFF2-40B4-BE49-F238E27FC236}">
+                <a16:creationId xmlns:a16="http://schemas.microsoft.com/office/drawing/2014/main" id="{403E7A06-7DEC-474F-AAF5-C711B1B5BE87}"/>
+              </a:ext>
+            </a:extLst>
+          </p:cNvPr>
+          <p:cNvPicPr>
+            <a:picLocks noChangeAspect="1"/>
+          </p:cNvPicPr>
+          <p:nvPr/>
+        </p:nvPicPr>
+        <p:blipFill rotWithShape="1">
+          <a:blip r:embed="rId4"/>
+          <a:srcRect t="4474"/>
+          <a:stretch/>
+        </p:blipFill>
+        <p:spPr>
+          <a:xfrm>
+            <a:off x="5768859" y="5623215"/>
+            <a:ext cx="4521432" cy="1552949"/>
+          </a:xfrm>
+          <a:prstGeom prst="rect">
+            <a:avLst/>
+          </a:prstGeom>
+        </p:spPr>
+      </p:pic>
     </p:spTree>
     <p:extLst>
       <p:ext uri="{BB962C8B-B14F-4D97-AF65-F5344CB8AC3E}">
@@ -6336,6 +6471,113 @@
           <a:chExt cx="0" cy="0"/>
         </a:xfrm>
       </p:grpSpPr>
+      <p:sp>
+        <p:nvSpPr>
+          <p:cNvPr id="2" name="TextBox 1">
+            <a:extLst>
+              <a:ext uri="{FF2B5EF4-FFF2-40B4-BE49-F238E27FC236}">
+                <a16:creationId xmlns:a16="http://schemas.microsoft.com/office/drawing/2014/main" id="{92D94D43-9433-4ED9-BB89-1A7C4AD64EBA}"/>
+              </a:ext>
+            </a:extLst>
+          </p:cNvPr>
+          <p:cNvSpPr txBox="1"/>
+          <p:nvPr/>
+        </p:nvSpPr>
+        <p:spPr>
+          <a:xfrm>
+            <a:off x="0" y="-48134"/>
+            <a:ext cx="3228975" cy="369332"/>
+          </a:xfrm>
+          <a:prstGeom prst="rect">
+            <a:avLst/>
+          </a:prstGeom>
+          <a:noFill/>
+        </p:spPr>
+        <p:txBody>
+          <a:bodyPr wrap="square" rtlCol="0">
+            <a:spAutoFit/>
+          </a:bodyPr>
+          <a:lstStyle/>
+          <a:p>
+            <a:r>
+              <a:rPr lang="en-US" dirty="0" err="1"/>
+              <a:t>Correo</a:t>
+            </a:r>
+            <a:r>
+              <a:rPr lang="en-US" dirty="0"/>
+              <a:t> </a:t>
+            </a:r>
+            <a:r>
+              <a:rPr lang="en-US" dirty="0" err="1"/>
+              <a:t>Negocio</a:t>
+            </a:r>
+            <a:r>
+              <a:rPr lang="en-US" dirty="0"/>
+              <a:t> 3</a:t>
+            </a:r>
+          </a:p>
+        </p:txBody>
+      </p:sp>
+      <p:pic>
+        <p:nvPicPr>
+          <p:cNvPr id="4" name="Picture 3">
+            <a:extLst>
+              <a:ext uri="{FF2B5EF4-FFF2-40B4-BE49-F238E27FC236}">
+                <a16:creationId xmlns:a16="http://schemas.microsoft.com/office/drawing/2014/main" id="{38C06F97-CD3D-451A-9514-5F3BBB406B3C}"/>
+              </a:ext>
+            </a:extLst>
+          </p:cNvPr>
+          <p:cNvPicPr>
+            <a:picLocks noChangeAspect="1"/>
+          </p:cNvPicPr>
+          <p:nvPr/>
+        </p:nvPicPr>
+        <p:blipFill>
+          <a:blip r:embed="rId2"/>
+          <a:stretch>
+            <a:fillRect/>
+          </a:stretch>
+        </p:blipFill>
+        <p:spPr>
+          <a:xfrm>
+            <a:off x="2085878" y="549127"/>
+            <a:ext cx="3772094" cy="5759746"/>
+          </a:xfrm>
+          <a:prstGeom prst="rect">
+            <a:avLst/>
+          </a:prstGeom>
+        </p:spPr>
+      </p:pic>
+      <p:pic>
+        <p:nvPicPr>
+          <p:cNvPr id="6" name="Picture 5">
+            <a:extLst>
+              <a:ext uri="{FF2B5EF4-FFF2-40B4-BE49-F238E27FC236}">
+                <a16:creationId xmlns:a16="http://schemas.microsoft.com/office/drawing/2014/main" id="{897BAC89-FD34-41B1-937B-586C29B8991A}"/>
+              </a:ext>
+            </a:extLst>
+          </p:cNvPr>
+          <p:cNvPicPr>
+            <a:picLocks noChangeAspect="1"/>
+          </p:cNvPicPr>
+          <p:nvPr/>
+        </p:nvPicPr>
+        <p:blipFill>
+          <a:blip r:embed="rId3"/>
+          <a:stretch>
+            <a:fillRect/>
+          </a:stretch>
+        </p:blipFill>
+        <p:spPr>
+          <a:xfrm>
+            <a:off x="7083328" y="1368319"/>
+            <a:ext cx="3778444" cy="4940554"/>
+          </a:xfrm>
+          <a:prstGeom prst="rect">
+            <a:avLst/>
+          </a:prstGeom>
+        </p:spPr>
+      </p:pic>
     </p:spTree>
     <p:extLst>
       <p:ext uri="{BB962C8B-B14F-4D97-AF65-F5344CB8AC3E}">

</xml_diff>